<commit_message>
still working on specs
</commit_message>
<xml_diff>
--- a/DesignAndSpecifications/MoniScope_GraphicDesign.pptx
+++ b/DesignAndSpecifications/MoniScope_GraphicDesign.pptx
@@ -245,7 +245,7 @@
           <a:p>
             <a:fld id="{BD48FC9A-E00B-468E-B8B9-A897C94C5B68}" type="datetimeFigureOut">
               <a:rPr lang="en-US" smtClean="0"/>
-              <a:t>2016-11-03</a:t>
+              <a:t>2016-11-05</a:t>
             </a:fld>
             <a:endParaRPr lang="en-US"/>
           </a:p>
@@ -415,7 +415,7 @@
           <a:p>
             <a:fld id="{BD48FC9A-E00B-468E-B8B9-A897C94C5B68}" type="datetimeFigureOut">
               <a:rPr lang="en-US" smtClean="0"/>
-              <a:t>2016-11-03</a:t>
+              <a:t>2016-11-05</a:t>
             </a:fld>
             <a:endParaRPr lang="en-US"/>
           </a:p>
@@ -595,7 +595,7 @@
           <a:p>
             <a:fld id="{BD48FC9A-E00B-468E-B8B9-A897C94C5B68}" type="datetimeFigureOut">
               <a:rPr lang="en-US" smtClean="0"/>
-              <a:t>2016-11-03</a:t>
+              <a:t>2016-11-05</a:t>
             </a:fld>
             <a:endParaRPr lang="en-US"/>
           </a:p>
@@ -765,7 +765,7 @@
           <a:p>
             <a:fld id="{BD48FC9A-E00B-468E-B8B9-A897C94C5B68}" type="datetimeFigureOut">
               <a:rPr lang="en-US" smtClean="0"/>
-              <a:t>2016-11-03</a:t>
+              <a:t>2016-11-05</a:t>
             </a:fld>
             <a:endParaRPr lang="en-US"/>
           </a:p>
@@ -1009,7 +1009,7 @@
           <a:p>
             <a:fld id="{BD48FC9A-E00B-468E-B8B9-A897C94C5B68}" type="datetimeFigureOut">
               <a:rPr lang="en-US" smtClean="0"/>
-              <a:t>2016-11-03</a:t>
+              <a:t>2016-11-05</a:t>
             </a:fld>
             <a:endParaRPr lang="en-US"/>
           </a:p>
@@ -1241,7 +1241,7 @@
           <a:p>
             <a:fld id="{BD48FC9A-E00B-468E-B8B9-A897C94C5B68}" type="datetimeFigureOut">
               <a:rPr lang="en-US" smtClean="0"/>
-              <a:t>2016-11-03</a:t>
+              <a:t>2016-11-05</a:t>
             </a:fld>
             <a:endParaRPr lang="en-US"/>
           </a:p>
@@ -1608,7 +1608,7 @@
           <a:p>
             <a:fld id="{BD48FC9A-E00B-468E-B8B9-A897C94C5B68}" type="datetimeFigureOut">
               <a:rPr lang="en-US" smtClean="0"/>
-              <a:t>2016-11-03</a:t>
+              <a:t>2016-11-05</a:t>
             </a:fld>
             <a:endParaRPr lang="en-US"/>
           </a:p>
@@ -1726,7 +1726,7 @@
           <a:p>
             <a:fld id="{BD48FC9A-E00B-468E-B8B9-A897C94C5B68}" type="datetimeFigureOut">
               <a:rPr lang="en-US" smtClean="0"/>
-              <a:t>2016-11-03</a:t>
+              <a:t>2016-11-05</a:t>
             </a:fld>
             <a:endParaRPr lang="en-US"/>
           </a:p>
@@ -1821,7 +1821,7 @@
           <a:p>
             <a:fld id="{BD48FC9A-E00B-468E-B8B9-A897C94C5B68}" type="datetimeFigureOut">
               <a:rPr lang="en-US" smtClean="0"/>
-              <a:t>2016-11-03</a:t>
+              <a:t>2016-11-05</a:t>
             </a:fld>
             <a:endParaRPr lang="en-US"/>
           </a:p>
@@ -2098,7 +2098,7 @@
           <a:p>
             <a:fld id="{BD48FC9A-E00B-468E-B8B9-A897C94C5B68}" type="datetimeFigureOut">
               <a:rPr lang="en-US" smtClean="0"/>
-              <a:t>2016-11-03</a:t>
+              <a:t>2016-11-05</a:t>
             </a:fld>
             <a:endParaRPr lang="en-US"/>
           </a:p>
@@ -2355,7 +2355,7 @@
           <a:p>
             <a:fld id="{BD48FC9A-E00B-468E-B8B9-A897C94C5B68}" type="datetimeFigureOut">
               <a:rPr lang="en-US" smtClean="0"/>
-              <a:t>2016-11-03</a:t>
+              <a:t>2016-11-05</a:t>
             </a:fld>
             <a:endParaRPr lang="en-US"/>
           </a:p>
@@ -2568,7 +2568,7 @@
           <a:p>
             <a:fld id="{BD48FC9A-E00B-468E-B8B9-A897C94C5B68}" type="datetimeFigureOut">
               <a:rPr lang="en-US" smtClean="0"/>
-              <a:t>2016-11-03</a:t>
+              <a:t>2016-11-05</a:t>
             </a:fld>
             <a:endParaRPr lang="en-US"/>
           </a:p>
@@ -3465,7 +3465,7 @@
           <a:p>
             <a:pPr algn="ctr"/>
             <a:r>
-              <a:rPr lang="en-US" sz="4000" b="1" dirty="0" err="1" smtClean="0">
+              <a:rPr lang="en-US" sz="4000" b="1" dirty="0" smtClean="0">
                 <a:solidFill>
                   <a:schemeClr val="bg2">
                     <a:lumMod val="25000"/>
@@ -3475,7 +3475,7 @@
               <a:t>Moni</a:t>
             </a:r>
             <a:r>
-              <a:rPr lang="en-US" sz="4000" b="1" i="1" dirty="0" err="1" smtClean="0">
+              <a:rPr lang="en-US" sz="4000" b="1" i="1" dirty="0" smtClean="0">
                 <a:solidFill>
                   <a:schemeClr val="bg2">
                     <a:lumMod val="25000"/>
@@ -3556,6 +3556,11 @@
           <a:prstGeom prst="downArrow">
             <a:avLst/>
           </a:prstGeom>
+          <a:solidFill>
+            <a:srgbClr val="4472C4">
+              <a:alpha val="25882"/>
+            </a:srgbClr>
+          </a:solidFill>
           <a:ln>
             <a:solidFill>
               <a:schemeClr val="accent1">
@@ -4418,6 +4423,76 @@
           </a:p>
         </p:txBody>
       </p:sp>
+      <p:sp>
+        <p:nvSpPr>
+          <p:cNvPr id="23" name="Rounded Rectangle 22"/>
+          <p:cNvSpPr/>
+          <p:nvPr/>
+        </p:nvSpPr>
+        <p:spPr>
+          <a:xfrm>
+            <a:off x="9152042" y="146284"/>
+            <a:ext cx="2959691" cy="284514"/>
+          </a:xfrm>
+          <a:prstGeom prst="roundRect">
+            <a:avLst/>
+          </a:prstGeom>
+          <a:solidFill>
+            <a:schemeClr val="accent5">
+              <a:lumMod val="60000"/>
+              <a:lumOff val="40000"/>
+              <a:alpha val="61961"/>
+            </a:schemeClr>
+          </a:solidFill>
+          <a:ln>
+            <a:solidFill>
+              <a:schemeClr val="tx2">
+                <a:lumMod val="20000"/>
+                <a:lumOff val="80000"/>
+              </a:schemeClr>
+            </a:solidFill>
+          </a:ln>
+        </p:spPr>
+        <p:style>
+          <a:lnRef idx="1">
+            <a:schemeClr val="accent3"/>
+          </a:lnRef>
+          <a:fillRef idx="2">
+            <a:schemeClr val="accent3"/>
+          </a:fillRef>
+          <a:effectRef idx="1">
+            <a:schemeClr val="accent3"/>
+          </a:effectRef>
+          <a:fontRef idx="minor">
+            <a:schemeClr val="dk1"/>
+          </a:fontRef>
+        </p:style>
+        <p:txBody>
+          <a:bodyPr rtlCol="0" anchor="ctr"/>
+          <a:lstStyle/>
+          <a:p>
+            <a:r>
+              <a:rPr lang="en-US" sz="1400" b="1" dirty="0" smtClean="0">
+                <a:solidFill>
+                  <a:schemeClr val="tx1">
+                    <a:lumMod val="65000"/>
+                    <a:lumOff val="35000"/>
+                  </a:schemeClr>
+                </a:solidFill>
+              </a:rPr>
+              <a:t>Selected All</a:t>
+            </a:r>
+            <a:endParaRPr lang="en-US" sz="1400" b="1" dirty="0">
+              <a:solidFill>
+                <a:schemeClr val="tx1">
+                  <a:lumMod val="65000"/>
+                  <a:lumOff val="35000"/>
+                </a:schemeClr>
+              </a:solidFill>
+            </a:endParaRPr>
+          </a:p>
+        </p:txBody>
+      </p:sp>
     </p:spTree>
     <p:extLst>
       <p:ext uri="{BB962C8B-B14F-4D97-AF65-F5344CB8AC3E}">
@@ -5796,6 +5871,492 @@
               <a:rPr lang="en-US" dirty="0"/>
               <a:t>72degF</a:t>
             </a:r>
+          </a:p>
+        </p:txBody>
+      </p:sp>
+      <p:sp>
+        <p:nvSpPr>
+          <p:cNvPr id="44" name="Rounded Rectangle 43"/>
+          <p:cNvSpPr/>
+          <p:nvPr/>
+        </p:nvSpPr>
+        <p:spPr>
+          <a:xfrm>
+            <a:off x="9152042" y="146284"/>
+            <a:ext cx="2959691" cy="284514"/>
+          </a:xfrm>
+          <a:prstGeom prst="roundRect">
+            <a:avLst/>
+          </a:prstGeom>
+          <a:solidFill>
+            <a:schemeClr val="accent5">
+              <a:lumMod val="60000"/>
+              <a:lumOff val="40000"/>
+              <a:alpha val="61961"/>
+            </a:schemeClr>
+          </a:solidFill>
+          <a:ln>
+            <a:solidFill>
+              <a:schemeClr val="tx2">
+                <a:lumMod val="20000"/>
+                <a:lumOff val="80000"/>
+              </a:schemeClr>
+            </a:solidFill>
+          </a:ln>
+        </p:spPr>
+        <p:style>
+          <a:lnRef idx="1">
+            <a:schemeClr val="accent3"/>
+          </a:lnRef>
+          <a:fillRef idx="2">
+            <a:schemeClr val="accent3"/>
+          </a:fillRef>
+          <a:effectRef idx="1">
+            <a:schemeClr val="accent3"/>
+          </a:effectRef>
+          <a:fontRef idx="minor">
+            <a:schemeClr val="dk1"/>
+          </a:fontRef>
+        </p:style>
+        <p:txBody>
+          <a:bodyPr rtlCol="0" anchor="ctr"/>
+          <a:lstStyle/>
+          <a:p>
+            <a:r>
+              <a:rPr lang="en-US" sz="1400" b="1" dirty="0" smtClean="0">
+                <a:solidFill>
+                  <a:schemeClr val="tx1">
+                    <a:lumMod val="65000"/>
+                    <a:lumOff val="35000"/>
+                  </a:schemeClr>
+                </a:solidFill>
+              </a:rPr>
+              <a:t>Selected multiple</a:t>
+            </a:r>
+            <a:endParaRPr lang="en-US" sz="1400" b="1" dirty="0">
+              <a:solidFill>
+                <a:schemeClr val="tx1">
+                  <a:lumMod val="65000"/>
+                  <a:lumOff val="35000"/>
+                </a:schemeClr>
+              </a:solidFill>
+            </a:endParaRPr>
+          </a:p>
+        </p:txBody>
+      </p:sp>
+      <p:sp>
+        <p:nvSpPr>
+          <p:cNvPr id="3" name="Rounded Rectangular Callout 2"/>
+          <p:cNvSpPr/>
+          <p:nvPr/>
+        </p:nvSpPr>
+        <p:spPr>
+          <a:xfrm flipV="1">
+            <a:off x="4145790" y="3822258"/>
+            <a:ext cx="3963744" cy="1980514"/>
+          </a:xfrm>
+          <a:prstGeom prst="wedgeRoundRectCallout">
+            <a:avLst>
+              <a:gd name="adj1" fmla="val -40785"/>
+              <a:gd name="adj2" fmla="val 78722"/>
+              <a:gd name="adj3" fmla="val 16667"/>
+            </a:avLst>
+          </a:prstGeom>
+          <a:solidFill>
+            <a:schemeClr val="bg2">
+              <a:lumMod val="90000"/>
+            </a:schemeClr>
+          </a:solidFill>
+          <a:ln>
+            <a:solidFill>
+              <a:schemeClr val="bg1">
+                <a:lumMod val="85000"/>
+              </a:schemeClr>
+            </a:solidFill>
+            <a:miter lim="800000"/>
+          </a:ln>
+          <a:effectLst>
+            <a:outerShdw blurRad="50800" dist="38100" dir="2700000" algn="tl" rotWithShape="0">
+              <a:prstClr val="black">
+                <a:alpha val="40000"/>
+              </a:prstClr>
+            </a:outerShdw>
+          </a:effectLst>
+        </p:spPr>
+        <p:style>
+          <a:lnRef idx="2">
+            <a:schemeClr val="accent1">
+              <a:shade val="50000"/>
+            </a:schemeClr>
+          </a:lnRef>
+          <a:fillRef idx="1">
+            <a:schemeClr val="accent1"/>
+          </a:fillRef>
+          <a:effectRef idx="0">
+            <a:schemeClr val="accent1"/>
+          </a:effectRef>
+          <a:fontRef idx="minor">
+            <a:schemeClr val="lt1"/>
+          </a:fontRef>
+        </p:style>
+        <p:txBody>
+          <a:bodyPr rtlCol="0" anchor="ctr"/>
+          <a:lstStyle/>
+          <a:p>
+            <a:pPr algn="ctr"/>
+            <a:endParaRPr lang="en-US" dirty="0"/>
+          </a:p>
+        </p:txBody>
+      </p:sp>
+      <p:sp>
+        <p:nvSpPr>
+          <p:cNvPr id="45" name="TextBox 44"/>
+          <p:cNvSpPr txBox="1"/>
+          <p:nvPr/>
+        </p:nvSpPr>
+        <p:spPr>
+          <a:xfrm>
+            <a:off x="7223419" y="4214218"/>
+            <a:ext cx="668453" cy="138499"/>
+          </a:xfrm>
+          <a:prstGeom prst="rect">
+            <a:avLst/>
+          </a:prstGeom>
+          <a:noFill/>
+          <a:ln>
+            <a:noFill/>
+          </a:ln>
+          <a:effectLst/>
+        </p:spPr>
+        <p:txBody>
+          <a:bodyPr wrap="none" lIns="0" tIns="0" rIns="0" bIns="0" rtlCol="0" anchor="ctr">
+            <a:spAutoFit/>
+          </a:bodyPr>
+          <a:lstStyle>
+            <a:defPPr>
+              <a:defRPr lang="en-US"/>
+            </a:defPPr>
+            <a:lvl1pPr>
+              <a:defRPr sz="800"/>
+            </a:lvl1pPr>
+          </a:lstStyle>
+          <a:p>
+            <a:r>
+              <a:rPr lang="en-US" sz="900" dirty="0" smtClean="0">
+                <a:solidFill>
+                  <a:schemeClr val="bg2">
+                    <a:lumMod val="25000"/>
+                  </a:schemeClr>
+                </a:solidFill>
+              </a:rPr>
+              <a:t>Battery: 12.1V</a:t>
+            </a:r>
+            <a:endParaRPr lang="en-US" sz="900" dirty="0">
+              <a:solidFill>
+                <a:schemeClr val="bg2">
+                  <a:lumMod val="25000"/>
+                </a:schemeClr>
+              </a:solidFill>
+            </a:endParaRPr>
+          </a:p>
+        </p:txBody>
+      </p:sp>
+      <p:sp>
+        <p:nvSpPr>
+          <p:cNvPr id="46" name="TextBox 45"/>
+          <p:cNvSpPr txBox="1"/>
+          <p:nvPr/>
+        </p:nvSpPr>
+        <p:spPr>
+          <a:xfrm>
+            <a:off x="7229905" y="4415258"/>
+            <a:ext cx="690895" cy="138499"/>
+          </a:xfrm>
+          <a:prstGeom prst="rect">
+            <a:avLst/>
+          </a:prstGeom>
+          <a:noFill/>
+          <a:ln>
+            <a:noFill/>
+          </a:ln>
+          <a:effectLst/>
+        </p:spPr>
+        <p:txBody>
+          <a:bodyPr wrap="none" lIns="0" tIns="0" rIns="0" bIns="0" rtlCol="0" anchor="ctr">
+            <a:spAutoFit/>
+          </a:bodyPr>
+          <a:lstStyle>
+            <a:defPPr>
+              <a:defRPr lang="en-US"/>
+            </a:defPPr>
+            <a:lvl1pPr>
+              <a:defRPr sz="800"/>
+            </a:lvl1pPr>
+          </a:lstStyle>
+          <a:p>
+            <a:r>
+              <a:rPr lang="en-US" sz="900" dirty="0" smtClean="0">
+                <a:solidFill>
+                  <a:schemeClr val="bg2">
+                    <a:lumMod val="25000"/>
+                  </a:schemeClr>
+                </a:solidFill>
+              </a:rPr>
+              <a:t>Temp: 72degF</a:t>
+            </a:r>
+            <a:endParaRPr lang="en-US" sz="900" dirty="0">
+              <a:solidFill>
+                <a:schemeClr val="bg2">
+                  <a:lumMod val="25000"/>
+                </a:schemeClr>
+              </a:solidFill>
+            </a:endParaRPr>
+          </a:p>
+        </p:txBody>
+      </p:sp>
+      <p:sp>
+        <p:nvSpPr>
+          <p:cNvPr id="47" name="TextBox 46"/>
+          <p:cNvSpPr txBox="1"/>
+          <p:nvPr/>
+        </p:nvSpPr>
+        <p:spPr>
+          <a:xfrm>
+            <a:off x="7236391" y="4608604"/>
+            <a:ext cx="508152" cy="153888"/>
+          </a:xfrm>
+          <a:prstGeom prst="rect">
+            <a:avLst/>
+          </a:prstGeom>
+          <a:noFill/>
+          <a:ln>
+            <a:noFill/>
+          </a:ln>
+          <a:effectLst/>
+        </p:spPr>
+        <p:txBody>
+          <a:bodyPr wrap="none" lIns="0" tIns="0" rIns="0" bIns="0" rtlCol="0" anchor="ctr">
+            <a:spAutoFit/>
+          </a:bodyPr>
+          <a:lstStyle>
+            <a:defPPr>
+              <a:defRPr lang="en-US"/>
+            </a:defPPr>
+            <a:lvl1pPr>
+              <a:defRPr sz="800"/>
+            </a:lvl1pPr>
+          </a:lstStyle>
+          <a:p>
+            <a:r>
+              <a:rPr lang="en-US" sz="1000" b="1" dirty="0">
+                <a:solidFill>
+                  <a:schemeClr val="bg2">
+                    <a:lumMod val="25000"/>
+                  </a:schemeClr>
+                </a:solidFill>
+              </a:rPr>
+              <a:t>X</a:t>
+            </a:r>
+            <a:r>
+              <a:rPr lang="en-US" sz="1000" b="1" dirty="0" smtClean="0">
+                <a:solidFill>
+                  <a:schemeClr val="bg2">
+                    <a:lumMod val="25000"/>
+                  </a:schemeClr>
+                </a:solidFill>
+              </a:rPr>
+              <a:t>: 6.0mm</a:t>
+            </a:r>
+            <a:endParaRPr lang="en-US" sz="1000" b="1" dirty="0">
+              <a:solidFill>
+                <a:schemeClr val="bg2">
+                  <a:lumMod val="25000"/>
+                </a:schemeClr>
+              </a:solidFill>
+            </a:endParaRPr>
+          </a:p>
+        </p:txBody>
+      </p:sp>
+      <p:sp>
+        <p:nvSpPr>
+          <p:cNvPr id="48" name="TextBox 47"/>
+          <p:cNvSpPr txBox="1"/>
+          <p:nvPr/>
+        </p:nvSpPr>
+        <p:spPr>
+          <a:xfrm>
+            <a:off x="7242877" y="4817338"/>
+            <a:ext cx="500137" cy="138499"/>
+          </a:xfrm>
+          <a:prstGeom prst="rect">
+            <a:avLst/>
+          </a:prstGeom>
+          <a:noFill/>
+          <a:ln>
+            <a:noFill/>
+          </a:ln>
+          <a:effectLst/>
+        </p:spPr>
+        <p:txBody>
+          <a:bodyPr wrap="none" lIns="0" tIns="0" rIns="0" bIns="0" rtlCol="0" anchor="ctr">
+            <a:spAutoFit/>
+          </a:bodyPr>
+          <a:lstStyle>
+            <a:defPPr>
+              <a:defRPr lang="en-US"/>
+            </a:defPPr>
+            <a:lvl1pPr>
+              <a:defRPr sz="800"/>
+            </a:lvl1pPr>
+          </a:lstStyle>
+          <a:p>
+            <a:r>
+              <a:rPr lang="en-US" sz="900" dirty="0" smtClean="0">
+                <a:solidFill>
+                  <a:schemeClr val="bg2">
+                    <a:lumMod val="25000"/>
+                  </a:schemeClr>
+                </a:solidFill>
+              </a:rPr>
+              <a:t>Y: 10.0mm</a:t>
+            </a:r>
+            <a:endParaRPr lang="en-US" sz="900" dirty="0">
+              <a:solidFill>
+                <a:schemeClr val="bg2">
+                  <a:lumMod val="25000"/>
+                </a:schemeClr>
+              </a:solidFill>
+            </a:endParaRPr>
+          </a:p>
+        </p:txBody>
+      </p:sp>
+      <p:sp>
+        <p:nvSpPr>
+          <p:cNvPr id="49" name="TextBox 48"/>
+          <p:cNvSpPr txBox="1"/>
+          <p:nvPr/>
+        </p:nvSpPr>
+        <p:spPr>
+          <a:xfrm>
+            <a:off x="7249363" y="5018378"/>
+            <a:ext cx="440826" cy="138499"/>
+          </a:xfrm>
+          <a:prstGeom prst="rect">
+            <a:avLst/>
+          </a:prstGeom>
+          <a:noFill/>
+          <a:ln>
+            <a:noFill/>
+          </a:ln>
+          <a:effectLst/>
+        </p:spPr>
+        <p:txBody>
+          <a:bodyPr wrap="none" lIns="0" tIns="0" rIns="0" bIns="0" rtlCol="0" anchor="ctr">
+            <a:spAutoFit/>
+          </a:bodyPr>
+          <a:lstStyle>
+            <a:defPPr>
+              <a:defRPr lang="en-US"/>
+            </a:defPPr>
+            <a:lvl1pPr>
+              <a:defRPr sz="800"/>
+            </a:lvl1pPr>
+          </a:lstStyle>
+          <a:p>
+            <a:r>
+              <a:rPr lang="en-US" sz="900" dirty="0" smtClean="0">
+                <a:solidFill>
+                  <a:schemeClr val="bg2">
+                    <a:lumMod val="25000"/>
+                  </a:schemeClr>
+                </a:solidFill>
+              </a:rPr>
+              <a:t>Z: 3.2mm</a:t>
+            </a:r>
+            <a:endParaRPr lang="en-US" sz="900" dirty="0">
+              <a:solidFill>
+                <a:schemeClr val="bg2">
+                  <a:lumMod val="25000"/>
+                </a:schemeClr>
+              </a:solidFill>
+            </a:endParaRPr>
+          </a:p>
+        </p:txBody>
+      </p:sp>
+      <p:pic>
+        <p:nvPicPr>
+          <p:cNvPr id="4" name="Picture 3"/>
+          <p:cNvPicPr>
+            <a:picLocks noChangeAspect="1"/>
+          </p:cNvPicPr>
+          <p:nvPr/>
+        </p:nvPicPr>
+        <p:blipFill>
+          <a:blip r:embed="rId4"/>
+          <a:stretch>
+            <a:fillRect/>
+          </a:stretch>
+        </p:blipFill>
+        <p:spPr>
+          <a:xfrm>
+            <a:off x="4293445" y="3960218"/>
+            <a:ext cx="2877412" cy="1773499"/>
+          </a:xfrm>
+          <a:prstGeom prst="rect">
+            <a:avLst/>
+          </a:prstGeom>
+        </p:spPr>
+      </p:pic>
+      <p:sp>
+        <p:nvSpPr>
+          <p:cNvPr id="51" name="TextBox 50"/>
+          <p:cNvSpPr txBox="1"/>
+          <p:nvPr/>
+        </p:nvSpPr>
+        <p:spPr>
+          <a:xfrm>
+            <a:off x="7223419" y="3980259"/>
+            <a:ext cx="819135" cy="138499"/>
+          </a:xfrm>
+          <a:prstGeom prst="rect">
+            <a:avLst/>
+          </a:prstGeom>
+          <a:noFill/>
+          <a:ln>
+            <a:noFill/>
+          </a:ln>
+          <a:effectLst/>
+        </p:spPr>
+        <p:txBody>
+          <a:bodyPr wrap="none" lIns="0" tIns="0" rIns="0" bIns="0" rtlCol="0" anchor="ctr">
+            <a:spAutoFit/>
+          </a:bodyPr>
+          <a:lstStyle>
+            <a:defPPr>
+              <a:defRPr lang="en-US"/>
+            </a:defPPr>
+            <a:lvl1pPr>
+              <a:defRPr sz="800"/>
+            </a:lvl1pPr>
+          </a:lstStyle>
+          <a:p>
+            <a:r>
+              <a:rPr lang="en-US" sz="900" b="1" dirty="0" smtClean="0">
+                <a:solidFill>
+                  <a:schemeClr val="bg2">
+                    <a:lumMod val="25000"/>
+                  </a:schemeClr>
+                </a:solidFill>
+              </a:rPr>
+              <a:t>2016-11-05 16:15</a:t>
+            </a:r>
+            <a:endParaRPr lang="en-US" sz="900" b="1" dirty="0">
+              <a:solidFill>
+                <a:schemeClr val="bg2">
+                  <a:lumMod val="25000"/>
+                </a:schemeClr>
+              </a:solidFill>
+            </a:endParaRPr>
           </a:p>
         </p:txBody>
       </p:sp>

</xml_diff>